<commit_message>
removed unnecessary files from top folder
</commit_message>
<xml_diff>
--- a/slidedecks/Project3_Group1_Combined_SlideDeck.pptx
+++ b/slidedecks/Project3_Group1_Combined_SlideDeck.pptx
@@ -5,7 +5,7 @@
     <p:sldMasterId id="2147483768" r:id="rId4"/>
   </p:sldMasterIdLst>
   <p:notesMasterIdLst>
-    <p:notesMasterId r:id="rId26"/>
+    <p:notesMasterId r:id="rId25"/>
   </p:notesMasterIdLst>
   <p:sldIdLst>
     <p:sldId id="3825" r:id="rId5"/>
@@ -16,19 +16,18 @@
     <p:sldId id="258" r:id="rId10"/>
     <p:sldId id="261" r:id="rId11"/>
     <p:sldId id="259" r:id="rId12"/>
-    <p:sldId id="260" r:id="rId13"/>
-    <p:sldId id="3856" r:id="rId14"/>
-    <p:sldId id="3852" r:id="rId15"/>
-    <p:sldId id="3853" r:id="rId16"/>
-    <p:sldId id="3854" r:id="rId17"/>
-    <p:sldId id="3855" r:id="rId18"/>
-    <p:sldId id="3844" r:id="rId19"/>
-    <p:sldId id="3845" r:id="rId20"/>
-    <p:sldId id="3846" r:id="rId21"/>
-    <p:sldId id="3847" r:id="rId22"/>
-    <p:sldId id="3848" r:id="rId23"/>
-    <p:sldId id="3849" r:id="rId24"/>
-    <p:sldId id="3850" r:id="rId25"/>
+    <p:sldId id="3856" r:id="rId13"/>
+    <p:sldId id="3852" r:id="rId14"/>
+    <p:sldId id="3853" r:id="rId15"/>
+    <p:sldId id="3854" r:id="rId16"/>
+    <p:sldId id="3855" r:id="rId17"/>
+    <p:sldId id="3844" r:id="rId18"/>
+    <p:sldId id="3845" r:id="rId19"/>
+    <p:sldId id="3846" r:id="rId20"/>
+    <p:sldId id="3847" r:id="rId21"/>
+    <p:sldId id="3848" r:id="rId22"/>
+    <p:sldId id="3849" r:id="rId23"/>
+    <p:sldId id="3850" r:id="rId24"/>
   </p:sldIdLst>
   <p:sldSz cx="12192000" cy="6858000"/>
   <p:notesSz cx="6858000" cy="9144000"/>
@@ -3676,7 +3675,7 @@
           <a:lstStyle/>
           <a:p>
             <a:fld id="{B9E4B866-C9B4-487D-8B04-721621B5BE38}" type="slidenum">
-              <a:t>20</a:t>
+              <a:t>19</a:t>
             </a:fld>
             <a:endParaRPr lang="en-US"/>
           </a:p>
@@ -15612,66 +15611,164 @@
       </p:grpSpPr>
       <p:sp>
         <p:nvSpPr>
-          <p:cNvPr id="2" name="Title 1">
-            <a:extLst>
-              <a:ext uri="{FF2B5EF4-FFF2-40B4-BE49-F238E27FC236}">
-                <a16:creationId xmlns:a16="http://schemas.microsoft.com/office/drawing/2014/main" id="{F3D8413F-CE7A-9AF7-EE59-2E8B811A6043}"/>
-              </a:ext>
-            </a:extLst>
-          </p:cNvPr>
-          <p:cNvSpPr>
-            <a:spLocks noGrp="1"/>
-          </p:cNvSpPr>
-          <p:nvPr>
-            <p:ph type="ctrTitle"/>
-          </p:nvPr>
+          <p:cNvPr id="7" name="TextBox 6">
+            <a:extLst>
+              <a:ext uri="{FF2B5EF4-FFF2-40B4-BE49-F238E27FC236}">
+                <a16:creationId xmlns:a16="http://schemas.microsoft.com/office/drawing/2014/main" id="{D84211B4-F8F6-3F9E-60C6-5181A6F4B545}"/>
+              </a:ext>
+            </a:extLst>
+          </p:cNvPr>
+          <p:cNvSpPr txBox="1"/>
+          <p:nvPr/>
         </p:nvSpPr>
         <p:spPr>
           <a:xfrm>
-            <a:off x="6471920" y="3881120"/>
-            <a:ext cx="3985064" cy="1527982"/>
+            <a:off x="503277" y="219572"/>
+            <a:ext cx="2823919" cy="1020027"/>
           </a:xfrm>
+          <a:prstGeom prst="rect">
+            <a:avLst/>
+          </a:prstGeom>
         </p:spPr>
         <p:txBody>
-          <a:bodyPr>
-            <a:noAutofit/>
+          <a:bodyPr vert="horz" lIns="91440" tIns="45720" rIns="91440" bIns="0" rtlCol="0" anchor="b">
+            <a:normAutofit/>
           </a:bodyPr>
           <a:lstStyle/>
           <a:p>
-            <a:r>
-              <a:rPr lang="en-US" sz="3600" dirty="0"/>
-              <a:t>Volume changes of Major stocks </a:t>
-            </a:r>
-            <a:br>
-              <a:rPr lang="en-US" sz="3600" dirty="0"/>
-            </a:br>
-            <a:br>
-              <a:rPr lang="en-AU" sz="2800" dirty="0"/>
-            </a:br>
-            <a:br>
-              <a:rPr lang="en-AU" sz="2800" dirty="0"/>
-            </a:br>
-            <a:r>
-              <a:rPr lang="en-US" sz="2800" dirty="0"/>
-              <a:t>Meta (formerly Facebook and Microsoft </a:t>
-            </a:r>
-            <a:br>
-              <a:rPr lang="en-US" sz="2800" dirty="0"/>
-            </a:br>
-            <a:br>
-              <a:rPr lang="en-AU" sz="2800" dirty="0"/>
-            </a:br>
-            <a:r>
-              <a:rPr lang="en-AU" sz="2800" dirty="0"/>
-              <a:t>by Ammar</a:t>
-            </a:r>
+            <a:pPr defTabSz="914400">
+              <a:lnSpc>
+                <a:spcPct val="90000"/>
+              </a:lnSpc>
+              <a:spcBef>
+                <a:spcPct val="0"/>
+              </a:spcBef>
+              <a:spcAft>
+                <a:spcPts val="600"/>
+              </a:spcAft>
+            </a:pPr>
+            <a:r>
+              <a:rPr lang="en-US" sz="2000" cap="all" dirty="0">
+                <a:latin typeface="Calibri" panose="020F0502020204030204" pitchFamily="34" charset="0"/>
+                <a:ea typeface="+mj-ea"/>
+                <a:cs typeface="Calibri" panose="020F0502020204030204" pitchFamily="34" charset="0"/>
+              </a:rPr>
+              <a:t>Volume changes for the period 2015 – 2018 for Meta</a:t>
+            </a:r>
+          </a:p>
+        </p:txBody>
+      </p:sp>
+      <p:pic>
+        <p:nvPicPr>
+          <p:cNvPr id="6" name="Picture 5" descr="A graph with red and green lines&#10;&#10;Description automatically generated">
+            <a:extLst>
+              <a:ext uri="{FF2B5EF4-FFF2-40B4-BE49-F238E27FC236}">
+                <a16:creationId xmlns:a16="http://schemas.microsoft.com/office/drawing/2014/main" id="{D253EED4-873C-B28E-5E80-A3CE06BC6683}"/>
+              </a:ext>
+            </a:extLst>
+          </p:cNvPr>
+          <p:cNvPicPr>
+            <a:picLocks noChangeAspect="1"/>
+          </p:cNvPicPr>
+          <p:nvPr/>
+        </p:nvPicPr>
+        <p:blipFill>
+          <a:blip r:embed="rId2">
+            <a:extLst>
+              <a:ext uri="{28A0092B-C50C-407E-A947-70E740481C1C}">
+                <a14:useLocalDpi xmlns:a14="http://schemas.microsoft.com/office/drawing/2010/main" val="0"/>
+              </a:ext>
+            </a:extLst>
+          </a:blip>
+          <a:stretch>
+            <a:fillRect/>
+          </a:stretch>
+        </p:blipFill>
+        <p:spPr>
+          <a:xfrm>
+            <a:off x="3850640" y="741680"/>
+            <a:ext cx="7050653" cy="4064000"/>
+          </a:xfrm>
+          <a:prstGeom prst="rect">
+            <a:avLst/>
+          </a:prstGeom>
+        </p:spPr>
+      </p:pic>
+      <p:sp>
+        <p:nvSpPr>
+          <p:cNvPr id="2" name="TextBox 1">
+            <a:extLst>
+              <a:ext uri="{FF2B5EF4-FFF2-40B4-BE49-F238E27FC236}">
+                <a16:creationId xmlns:a16="http://schemas.microsoft.com/office/drawing/2014/main" id="{B14652F3-3C52-8FA9-0B28-2720AC3AEA7F}"/>
+              </a:ext>
+            </a:extLst>
+          </p:cNvPr>
+          <p:cNvSpPr txBox="1"/>
+          <p:nvPr/>
+        </p:nvSpPr>
+        <p:spPr>
+          <a:xfrm>
+            <a:off x="344003" y="1397675"/>
+            <a:ext cx="3291385" cy="2031325"/>
+          </a:xfrm>
+          <a:prstGeom prst="rect">
+            <a:avLst/>
+          </a:prstGeom>
+          <a:noFill/>
+        </p:spPr>
+        <p:txBody>
+          <a:bodyPr wrap="square" rtlCol="0">
+            <a:spAutoFit/>
+          </a:bodyPr>
+          <a:lstStyle/>
+          <a:p>
+            <a:pPr marL="342900" indent="-342900">
+              <a:buAutoNum type="arabicPeriod"/>
+            </a:pPr>
+            <a:r>
+              <a:rPr lang="en-US" dirty="0">
+                <a:latin typeface="Calibri" panose="020F0502020204030204" pitchFamily="34" charset="0"/>
+                <a:cs typeface="Calibri" panose="020F0502020204030204" pitchFamily="34" charset="0"/>
+              </a:rPr>
+              <a:t>Earnings reports and Financial Performance </a:t>
+            </a:r>
+          </a:p>
+          <a:p>
+            <a:pPr marL="342900" indent="-342900">
+              <a:buAutoNum type="arabicPeriod"/>
+            </a:pPr>
+            <a:r>
+              <a:rPr lang="en-US" dirty="0">
+                <a:latin typeface="Calibri" panose="020F0502020204030204" pitchFamily="34" charset="0"/>
+                <a:cs typeface="Calibri" panose="020F0502020204030204" pitchFamily="34" charset="0"/>
+              </a:rPr>
+              <a:t>Strategic Developments and Corporate News</a:t>
+            </a:r>
+          </a:p>
+          <a:p>
+            <a:pPr marL="342900" indent="-342900">
+              <a:buAutoNum type="arabicPeriod"/>
+            </a:pPr>
+            <a:r>
+              <a:rPr lang="en-US" dirty="0">
+                <a:latin typeface="Calibri" panose="020F0502020204030204" pitchFamily="34" charset="0"/>
+                <a:cs typeface="Calibri" panose="020F0502020204030204" pitchFamily="34" charset="0"/>
+              </a:rPr>
+              <a:t>Regulatory Changes and Privacy Concerns</a:t>
+            </a:r>
+          </a:p>
+          <a:p>
+            <a:pPr marL="342900" indent="-342900">
+              <a:buAutoNum type="arabicPeriod"/>
+            </a:pPr>
+            <a:endParaRPr lang="en-US" dirty="0"/>
           </a:p>
         </p:txBody>
       </p:sp>
     </p:spTree>
     <p:extLst>
       <p:ext uri="{BB962C8B-B14F-4D97-AF65-F5344CB8AC3E}">
-        <p14:creationId xmlns:p14="http://schemas.microsoft.com/office/powerpoint/2010/main" val="2357426616"/>
+        <p14:creationId xmlns:p14="http://schemas.microsoft.com/office/powerpoint/2010/main" val="2742946692"/>
       </p:ext>
     </p:extLst>
   </p:cSld>
@@ -15700,10 +15797,10 @@
       </p:grpSpPr>
       <p:sp>
         <p:nvSpPr>
-          <p:cNvPr id="7" name="TextBox 6">
-            <a:extLst>
-              <a:ext uri="{FF2B5EF4-FFF2-40B4-BE49-F238E27FC236}">
-                <a16:creationId xmlns:a16="http://schemas.microsoft.com/office/drawing/2014/main" id="{D84211B4-F8F6-3F9E-60C6-5181A6F4B545}"/>
+          <p:cNvPr id="5" name="TextBox 4">
+            <a:extLst>
+              <a:ext uri="{FF2B5EF4-FFF2-40B4-BE49-F238E27FC236}">
+                <a16:creationId xmlns:a16="http://schemas.microsoft.com/office/drawing/2014/main" id="{9F827D28-6023-9F50-F742-CAC17DAC53D7}"/>
               </a:ext>
             </a:extLst>
           </p:cNvPr>
@@ -15712,8 +15809,8 @@
         </p:nvSpPr>
         <p:spPr>
           <a:xfrm>
-            <a:off x="503277" y="219572"/>
-            <a:ext cx="2823919" cy="1020027"/>
+            <a:off x="503277" y="186870"/>
+            <a:ext cx="2823919" cy="1063954"/>
           </a:xfrm>
           <a:prstGeom prst="rect">
             <a:avLst/>
@@ -15742,17 +15839,17 @@
                 <a:ea typeface="+mj-ea"/>
                 <a:cs typeface="Calibri" panose="020F0502020204030204" pitchFamily="34" charset="0"/>
               </a:rPr>
-              <a:t>Volume changes for the period 2015 – 2018 for Meta</a:t>
+              <a:t>Volume changes for the period 2019 – 2023 for Meta</a:t>
             </a:r>
           </a:p>
         </p:txBody>
       </p:sp>
       <p:pic>
         <p:nvPicPr>
-          <p:cNvPr id="6" name="Picture 5" descr="A graph with red and green lines&#10;&#10;Description automatically generated">
-            <a:extLst>
-              <a:ext uri="{FF2B5EF4-FFF2-40B4-BE49-F238E27FC236}">
-                <a16:creationId xmlns:a16="http://schemas.microsoft.com/office/drawing/2014/main" id="{D253EED4-873C-B28E-5E80-A3CE06BC6683}"/>
+          <p:cNvPr id="3" name="Picture 2" descr="A graph with red and green lines&#10;&#10;Description automatically generated">
+            <a:extLst>
+              <a:ext uri="{FF2B5EF4-FFF2-40B4-BE49-F238E27FC236}">
+                <a16:creationId xmlns:a16="http://schemas.microsoft.com/office/drawing/2014/main" id="{874AF08E-1371-5135-239D-BA7C25ADDD98}"/>
               </a:ext>
             </a:extLst>
           </p:cNvPr>
@@ -15775,8 +15872,8 @@
         </p:blipFill>
         <p:spPr>
           <a:xfrm>
-            <a:off x="3850640" y="741680"/>
-            <a:ext cx="7050653" cy="4064000"/>
+            <a:off x="4618374" y="1056640"/>
+            <a:ext cx="6282919" cy="3738880"/>
           </a:xfrm>
           <a:prstGeom prst="rect">
             <a:avLst/>
@@ -15788,7 +15885,7 @@
           <p:cNvPr id="2" name="TextBox 1">
             <a:extLst>
               <a:ext uri="{FF2B5EF4-FFF2-40B4-BE49-F238E27FC236}">
-                <a16:creationId xmlns:a16="http://schemas.microsoft.com/office/drawing/2014/main" id="{B14652F3-3C52-8FA9-0B28-2720AC3AEA7F}"/>
+                <a16:creationId xmlns:a16="http://schemas.microsoft.com/office/drawing/2014/main" id="{388BF01B-5AAA-DD11-AE9F-216A75F5BAED}"/>
               </a:ext>
             </a:extLst>
           </p:cNvPr>
@@ -15797,8 +15894,8 @@
         </p:nvSpPr>
         <p:spPr>
           <a:xfrm>
-            <a:off x="344003" y="1397675"/>
-            <a:ext cx="3291385" cy="2031325"/>
+            <a:off x="70625" y="1437694"/>
+            <a:ext cx="3838141" cy="1754326"/>
           </a:xfrm>
           <a:prstGeom prst="rect">
             <a:avLst/>
@@ -15819,7 +15916,7 @@
                 <a:latin typeface="Calibri" panose="020F0502020204030204" pitchFamily="34" charset="0"/>
                 <a:cs typeface="Calibri" panose="020F0502020204030204" pitchFamily="34" charset="0"/>
               </a:rPr>
-              <a:t>Earnings reports and Financial Performance </a:t>
+              <a:t>Earnings Reports and financial Performance </a:t>
             </a:r>
           </a:p>
           <a:p>
@@ -15831,7 +15928,7 @@
                 <a:latin typeface="Calibri" panose="020F0502020204030204" pitchFamily="34" charset="0"/>
                 <a:cs typeface="Calibri" panose="020F0502020204030204" pitchFamily="34" charset="0"/>
               </a:rPr>
-              <a:t>Strategic Developments and Corporate News</a:t>
+              <a:t>Market Sentiment and Investor Perception</a:t>
             </a:r>
           </a:p>
           <a:p>
@@ -15843,21 +15940,15 @@
                 <a:latin typeface="Calibri" panose="020F0502020204030204" pitchFamily="34" charset="0"/>
                 <a:cs typeface="Calibri" panose="020F0502020204030204" pitchFamily="34" charset="0"/>
               </a:rPr>
-              <a:t>Regulatory Changes and Privacy Concerns</a:t>
-            </a:r>
-          </a:p>
-          <a:p>
-            <a:pPr marL="342900" indent="-342900">
-              <a:buAutoNum type="arabicPeriod"/>
-            </a:pPr>
-            <a:endParaRPr lang="en-US" dirty="0"/>
+              <a:t>Global Economic Conditions and Industry Trends</a:t>
+            </a:r>
           </a:p>
         </p:txBody>
       </p:sp>
     </p:spTree>
     <p:extLst>
       <p:ext uri="{BB962C8B-B14F-4D97-AF65-F5344CB8AC3E}">
-        <p14:creationId xmlns:p14="http://schemas.microsoft.com/office/powerpoint/2010/main" val="2742946692"/>
+        <p14:creationId xmlns:p14="http://schemas.microsoft.com/office/powerpoint/2010/main" val="4291019453"/>
       </p:ext>
     </p:extLst>
   </p:cSld>
@@ -15886,10 +15977,10 @@
       </p:grpSpPr>
       <p:sp>
         <p:nvSpPr>
-          <p:cNvPr id="5" name="TextBox 4">
-            <a:extLst>
-              <a:ext uri="{FF2B5EF4-FFF2-40B4-BE49-F238E27FC236}">
-                <a16:creationId xmlns:a16="http://schemas.microsoft.com/office/drawing/2014/main" id="{9F827D28-6023-9F50-F742-CAC17DAC53D7}"/>
+          <p:cNvPr id="7" name="TextBox 6">
+            <a:extLst>
+              <a:ext uri="{FF2B5EF4-FFF2-40B4-BE49-F238E27FC236}">
+                <a16:creationId xmlns:a16="http://schemas.microsoft.com/office/drawing/2014/main" id="{FDAA82C4-4EC0-74B4-8E3F-F6A0876D8F7F}"/>
               </a:ext>
             </a:extLst>
           </p:cNvPr>
@@ -15898,8 +15989,8 @@
         </p:nvSpPr>
         <p:spPr>
           <a:xfrm>
-            <a:off x="503277" y="186870"/>
-            <a:ext cx="2823919" cy="1063954"/>
+            <a:off x="659301" y="434716"/>
+            <a:ext cx="2823919" cy="1325630"/>
           </a:xfrm>
           <a:prstGeom prst="rect">
             <a:avLst/>
@@ -15928,17 +16019,35 @@
                 <a:ea typeface="+mj-ea"/>
                 <a:cs typeface="Calibri" panose="020F0502020204030204" pitchFamily="34" charset="0"/>
               </a:rPr>
-              <a:t>Volume changes for the period 2019 – 2023 for Meta</a:t>
-            </a:r>
+              <a:t>Volume changes for the period 2015 – 2018 for Microsoft</a:t>
+            </a:r>
+          </a:p>
+          <a:p>
+            <a:pPr defTabSz="914400">
+              <a:lnSpc>
+                <a:spcPct val="90000"/>
+              </a:lnSpc>
+              <a:spcBef>
+                <a:spcPct val="0"/>
+              </a:spcBef>
+              <a:spcAft>
+                <a:spcPts val="600"/>
+              </a:spcAft>
+            </a:pPr>
+            <a:endParaRPr lang="en-US" sz="2500" cap="all" dirty="0">
+              <a:latin typeface="+mj-lt"/>
+              <a:ea typeface="+mj-ea"/>
+              <a:cs typeface="+mj-cs"/>
+            </a:endParaRPr>
           </a:p>
         </p:txBody>
       </p:sp>
       <p:pic>
         <p:nvPicPr>
-          <p:cNvPr id="3" name="Picture 2" descr="A graph with red and green lines&#10;&#10;Description automatically generated">
-            <a:extLst>
-              <a:ext uri="{FF2B5EF4-FFF2-40B4-BE49-F238E27FC236}">
-                <a16:creationId xmlns:a16="http://schemas.microsoft.com/office/drawing/2014/main" id="{874AF08E-1371-5135-239D-BA7C25ADDD98}"/>
+          <p:cNvPr id="5" name="Picture 4" descr="A graph with red and green lines&#10;&#10;Description automatically generated">
+            <a:extLst>
+              <a:ext uri="{FF2B5EF4-FFF2-40B4-BE49-F238E27FC236}">
+                <a16:creationId xmlns:a16="http://schemas.microsoft.com/office/drawing/2014/main" id="{D84099AD-9603-4CF8-7DAC-6573C33C0169}"/>
               </a:ext>
             </a:extLst>
           </p:cNvPr>
@@ -15961,8 +16070,8 @@
         </p:blipFill>
         <p:spPr>
           <a:xfrm>
-            <a:off x="4618374" y="1056640"/>
-            <a:ext cx="6282919" cy="3738880"/>
+            <a:off x="4618374" y="731520"/>
+            <a:ext cx="6282919" cy="3901440"/>
           </a:xfrm>
           <a:prstGeom prst="rect">
             <a:avLst/>
@@ -15974,7 +16083,7 @@
           <p:cNvPr id="2" name="TextBox 1">
             <a:extLst>
               <a:ext uri="{FF2B5EF4-FFF2-40B4-BE49-F238E27FC236}">
-                <a16:creationId xmlns:a16="http://schemas.microsoft.com/office/drawing/2014/main" id="{388BF01B-5AAA-DD11-AE9F-216A75F5BAED}"/>
+                <a16:creationId xmlns:a16="http://schemas.microsoft.com/office/drawing/2014/main" id="{BC05ACE8-8F84-AA1D-8C4F-37C1750A4014}"/>
               </a:ext>
             </a:extLst>
           </p:cNvPr>
@@ -15983,8 +16092,8 @@
         </p:nvSpPr>
         <p:spPr>
           <a:xfrm>
-            <a:off x="70625" y="1437694"/>
-            <a:ext cx="3838141" cy="1754326"/>
+            <a:off x="338294" y="1575131"/>
+            <a:ext cx="3302803" cy="1754326"/>
           </a:xfrm>
           <a:prstGeom prst="rect">
             <a:avLst/>
@@ -16005,7 +16114,7 @@
                 <a:latin typeface="Calibri" panose="020F0502020204030204" pitchFamily="34" charset="0"/>
                 <a:cs typeface="Calibri" panose="020F0502020204030204" pitchFamily="34" charset="0"/>
               </a:rPr>
-              <a:t>Earnings Reports and financial Performance </a:t>
+              <a:t>Dividend Announcements and Share Buybacks</a:t>
             </a:r>
           </a:p>
           <a:p>
@@ -16017,7 +16126,7 @@
                 <a:latin typeface="Calibri" panose="020F0502020204030204" pitchFamily="34" charset="0"/>
                 <a:cs typeface="Calibri" panose="020F0502020204030204" pitchFamily="34" charset="0"/>
               </a:rPr>
-              <a:t>Market Sentiment and Investor Perception</a:t>
+              <a:t>Product Releases and Strategic Initiatives</a:t>
             </a:r>
           </a:p>
           <a:p>
@@ -16029,7 +16138,7 @@
                 <a:latin typeface="Calibri" panose="020F0502020204030204" pitchFamily="34" charset="0"/>
                 <a:cs typeface="Calibri" panose="020F0502020204030204" pitchFamily="34" charset="0"/>
               </a:rPr>
-              <a:t>Global Economic Conditions and Industry Trends</a:t>
+              <a:t>Technology Sector Trends and Market Conditions</a:t>
             </a:r>
           </a:p>
         </p:txBody>
@@ -16037,7 +16146,7 @@
     </p:spTree>
     <p:extLst>
       <p:ext uri="{BB962C8B-B14F-4D97-AF65-F5344CB8AC3E}">
-        <p14:creationId xmlns:p14="http://schemas.microsoft.com/office/powerpoint/2010/main" val="4291019453"/>
+        <p14:creationId xmlns:p14="http://schemas.microsoft.com/office/powerpoint/2010/main" val="2784674850"/>
       </p:ext>
     </p:extLst>
   </p:cSld>
@@ -16066,204 +16175,6 @@
       </p:grpSpPr>
       <p:sp>
         <p:nvSpPr>
-          <p:cNvPr id="7" name="TextBox 6">
-            <a:extLst>
-              <a:ext uri="{FF2B5EF4-FFF2-40B4-BE49-F238E27FC236}">
-                <a16:creationId xmlns:a16="http://schemas.microsoft.com/office/drawing/2014/main" id="{FDAA82C4-4EC0-74B4-8E3F-F6A0876D8F7F}"/>
-              </a:ext>
-            </a:extLst>
-          </p:cNvPr>
-          <p:cNvSpPr txBox="1"/>
-          <p:nvPr/>
-        </p:nvSpPr>
-        <p:spPr>
-          <a:xfrm>
-            <a:off x="659301" y="434716"/>
-            <a:ext cx="2823919" cy="1325630"/>
-          </a:xfrm>
-          <a:prstGeom prst="rect">
-            <a:avLst/>
-          </a:prstGeom>
-        </p:spPr>
-        <p:txBody>
-          <a:bodyPr vert="horz" lIns="91440" tIns="45720" rIns="91440" bIns="0" rtlCol="0" anchor="b">
-            <a:normAutofit/>
-          </a:bodyPr>
-          <a:lstStyle/>
-          <a:p>
-            <a:pPr defTabSz="914400">
-              <a:lnSpc>
-                <a:spcPct val="90000"/>
-              </a:lnSpc>
-              <a:spcBef>
-                <a:spcPct val="0"/>
-              </a:spcBef>
-              <a:spcAft>
-                <a:spcPts val="600"/>
-              </a:spcAft>
-            </a:pPr>
-            <a:r>
-              <a:rPr lang="en-US" sz="2000" cap="all" dirty="0">
-                <a:latin typeface="Calibri" panose="020F0502020204030204" pitchFamily="34" charset="0"/>
-                <a:ea typeface="+mj-ea"/>
-                <a:cs typeface="Calibri" panose="020F0502020204030204" pitchFamily="34" charset="0"/>
-              </a:rPr>
-              <a:t>Volume changes for the period 2015 – 2018 for Microsoft</a:t>
-            </a:r>
-          </a:p>
-          <a:p>
-            <a:pPr defTabSz="914400">
-              <a:lnSpc>
-                <a:spcPct val="90000"/>
-              </a:lnSpc>
-              <a:spcBef>
-                <a:spcPct val="0"/>
-              </a:spcBef>
-              <a:spcAft>
-                <a:spcPts val="600"/>
-              </a:spcAft>
-            </a:pPr>
-            <a:endParaRPr lang="en-US" sz="2500" cap="all" dirty="0">
-              <a:latin typeface="+mj-lt"/>
-              <a:ea typeface="+mj-ea"/>
-              <a:cs typeface="+mj-cs"/>
-            </a:endParaRPr>
-          </a:p>
-        </p:txBody>
-      </p:sp>
-      <p:pic>
-        <p:nvPicPr>
-          <p:cNvPr id="5" name="Picture 4" descr="A graph with red and green lines&#10;&#10;Description automatically generated">
-            <a:extLst>
-              <a:ext uri="{FF2B5EF4-FFF2-40B4-BE49-F238E27FC236}">
-                <a16:creationId xmlns:a16="http://schemas.microsoft.com/office/drawing/2014/main" id="{D84099AD-9603-4CF8-7DAC-6573C33C0169}"/>
-              </a:ext>
-            </a:extLst>
-          </p:cNvPr>
-          <p:cNvPicPr>
-            <a:picLocks noChangeAspect="1"/>
-          </p:cNvPicPr>
-          <p:nvPr/>
-        </p:nvPicPr>
-        <p:blipFill>
-          <a:blip r:embed="rId2">
-            <a:extLst>
-              <a:ext uri="{28A0092B-C50C-407E-A947-70E740481C1C}">
-                <a14:useLocalDpi xmlns:a14="http://schemas.microsoft.com/office/drawing/2010/main" val="0"/>
-              </a:ext>
-            </a:extLst>
-          </a:blip>
-          <a:stretch>
-            <a:fillRect/>
-          </a:stretch>
-        </p:blipFill>
-        <p:spPr>
-          <a:xfrm>
-            <a:off x="4618374" y="731520"/>
-            <a:ext cx="6282919" cy="3901440"/>
-          </a:xfrm>
-          <a:prstGeom prst="rect">
-            <a:avLst/>
-          </a:prstGeom>
-        </p:spPr>
-      </p:pic>
-      <p:sp>
-        <p:nvSpPr>
-          <p:cNvPr id="2" name="TextBox 1">
-            <a:extLst>
-              <a:ext uri="{FF2B5EF4-FFF2-40B4-BE49-F238E27FC236}">
-                <a16:creationId xmlns:a16="http://schemas.microsoft.com/office/drawing/2014/main" id="{BC05ACE8-8F84-AA1D-8C4F-37C1750A4014}"/>
-              </a:ext>
-            </a:extLst>
-          </p:cNvPr>
-          <p:cNvSpPr txBox="1"/>
-          <p:nvPr/>
-        </p:nvSpPr>
-        <p:spPr>
-          <a:xfrm>
-            <a:off x="338294" y="1575131"/>
-            <a:ext cx="3302803" cy="1754326"/>
-          </a:xfrm>
-          <a:prstGeom prst="rect">
-            <a:avLst/>
-          </a:prstGeom>
-          <a:noFill/>
-        </p:spPr>
-        <p:txBody>
-          <a:bodyPr wrap="square" rtlCol="0">
-            <a:spAutoFit/>
-          </a:bodyPr>
-          <a:lstStyle/>
-          <a:p>
-            <a:pPr marL="342900" indent="-342900">
-              <a:buAutoNum type="arabicPeriod"/>
-            </a:pPr>
-            <a:r>
-              <a:rPr lang="en-US" dirty="0">
-                <a:latin typeface="Calibri" panose="020F0502020204030204" pitchFamily="34" charset="0"/>
-                <a:cs typeface="Calibri" panose="020F0502020204030204" pitchFamily="34" charset="0"/>
-              </a:rPr>
-              <a:t>Dividend Announcements and Share Buybacks</a:t>
-            </a:r>
-          </a:p>
-          <a:p>
-            <a:pPr marL="342900" indent="-342900">
-              <a:buAutoNum type="arabicPeriod"/>
-            </a:pPr>
-            <a:r>
-              <a:rPr lang="en-US" dirty="0">
-                <a:latin typeface="Calibri" panose="020F0502020204030204" pitchFamily="34" charset="0"/>
-                <a:cs typeface="Calibri" panose="020F0502020204030204" pitchFamily="34" charset="0"/>
-              </a:rPr>
-              <a:t>Product Releases and Strategic Initiatives</a:t>
-            </a:r>
-          </a:p>
-          <a:p>
-            <a:pPr marL="342900" indent="-342900">
-              <a:buAutoNum type="arabicPeriod"/>
-            </a:pPr>
-            <a:r>
-              <a:rPr lang="en-US" dirty="0">
-                <a:latin typeface="Calibri" panose="020F0502020204030204" pitchFamily="34" charset="0"/>
-                <a:cs typeface="Calibri" panose="020F0502020204030204" pitchFamily="34" charset="0"/>
-              </a:rPr>
-              <a:t>Technology Sector Trends and Market Conditions</a:t>
-            </a:r>
-          </a:p>
-        </p:txBody>
-      </p:sp>
-    </p:spTree>
-    <p:extLst>
-      <p:ext uri="{BB962C8B-B14F-4D97-AF65-F5344CB8AC3E}">
-        <p14:creationId xmlns:p14="http://schemas.microsoft.com/office/powerpoint/2010/main" val="2784674850"/>
-      </p:ext>
-    </p:extLst>
-  </p:cSld>
-  <p:clrMapOvr>
-    <a:masterClrMapping/>
-  </p:clrMapOvr>
-</p:sld>
-</file>
-
-<file path=ppt/slides/slide14.xml><?xml version="1.0" encoding="utf-8"?>
-<p:sld xmlns:a="http://schemas.openxmlformats.org/drawingml/2006/main" xmlns:r="http://schemas.openxmlformats.org/officeDocument/2006/relationships" xmlns:p="http://schemas.openxmlformats.org/presentationml/2006/main">
-  <p:cSld>
-    <p:spTree>
-      <p:nvGrpSpPr>
-        <p:cNvPr id="1" name=""/>
-        <p:cNvGrpSpPr/>
-        <p:nvPr/>
-      </p:nvGrpSpPr>
-      <p:grpSpPr>
-        <a:xfrm>
-          <a:off x="0" y="0"/>
-          <a:ext cx="0" cy="0"/>
-          <a:chOff x="0" y="0"/>
-          <a:chExt cx="0" cy="0"/>
-        </a:xfrm>
-      </p:grpSpPr>
-      <p:sp>
-        <p:nvSpPr>
           <p:cNvPr id="9" name="TextBox 8">
             <a:extLst>
               <a:ext uri="{FF2B5EF4-FFF2-40B4-BE49-F238E27FC236}">
@@ -16443,7 +16354,7 @@
 </p:sld>
 </file>
 
-<file path=ppt/slides/slide15.xml><?xml version="1.0" encoding="utf-8"?>
+<file path=ppt/slides/slide14.xml><?xml version="1.0" encoding="utf-8"?>
 <p:sld xmlns:a="http://schemas.openxmlformats.org/drawingml/2006/main" xmlns:r="http://schemas.openxmlformats.org/officeDocument/2006/relationships" xmlns:p="http://schemas.openxmlformats.org/presentationml/2006/main">
   <p:cSld>
     <p:spTree>
@@ -16741,7 +16652,7 @@
 </p:sld>
 </file>
 
-<file path=ppt/slides/slide16.xml><?xml version="1.0" encoding="utf-8"?>
+<file path=ppt/slides/slide15.xml><?xml version="1.0" encoding="utf-8"?>
 <p:sld xmlns:a="http://schemas.openxmlformats.org/drawingml/2006/main" xmlns:r="http://schemas.openxmlformats.org/officeDocument/2006/relationships" xmlns:p="http://schemas.openxmlformats.org/presentationml/2006/main">
   <p:cSld>
     <p:spTree>
@@ -16986,7 +16897,7 @@
 </p:sld>
 </file>
 
-<file path=ppt/slides/slide17.xml><?xml version="1.0" encoding="utf-8"?>
+<file path=ppt/slides/slide16.xml><?xml version="1.0" encoding="utf-8"?>
 <p:sld xmlns:a="http://schemas.openxmlformats.org/drawingml/2006/main" xmlns:r="http://schemas.openxmlformats.org/officeDocument/2006/relationships" xmlns:p="http://schemas.openxmlformats.org/presentationml/2006/main">
   <p:cSld>
     <p:spTree>
@@ -17231,7 +17142,7 @@
 </p:sld>
 </file>
 
-<file path=ppt/slides/slide18.xml><?xml version="1.0" encoding="utf-8"?>
+<file path=ppt/slides/slide17.xml><?xml version="1.0" encoding="utf-8"?>
 <p:sld xmlns:a="http://schemas.openxmlformats.org/drawingml/2006/main" xmlns:r="http://schemas.openxmlformats.org/officeDocument/2006/relationships" xmlns:p="http://schemas.openxmlformats.org/presentationml/2006/main">
   <p:cSld>
     <p:spTree>
@@ -17336,7 +17247,7 @@
 </p:sld>
 </file>
 
-<file path=ppt/slides/slide19.xml><?xml version="1.0" encoding="utf-8"?>
+<file path=ppt/slides/slide18.xml><?xml version="1.0" encoding="utf-8"?>
 <p:sld xmlns:a="http://schemas.openxmlformats.org/drawingml/2006/main" xmlns:r="http://schemas.openxmlformats.org/officeDocument/2006/relationships" xmlns:p="http://schemas.openxmlformats.org/presentationml/2006/main">
   <p:cSld>
     <p:spTree>
@@ -17846,6 +17757,142 @@
 </p:sld>
 </file>
 
+<file path=ppt/slides/slide19.xml><?xml version="1.0" encoding="utf-8"?>
+<p:sld xmlns:a="http://schemas.openxmlformats.org/drawingml/2006/main" xmlns:r="http://schemas.openxmlformats.org/officeDocument/2006/relationships" xmlns:p="http://schemas.openxmlformats.org/presentationml/2006/main">
+  <p:cSld>
+    <p:spTree>
+      <p:nvGrpSpPr>
+        <p:cNvPr id="1" name=""/>
+        <p:cNvGrpSpPr/>
+        <p:nvPr/>
+      </p:nvGrpSpPr>
+      <p:grpSpPr>
+        <a:xfrm>
+          <a:off x="0" y="0"/>
+          <a:ext cx="0" cy="0"/>
+          <a:chOff x="0" y="0"/>
+          <a:chExt cx="0" cy="0"/>
+        </a:xfrm>
+      </p:grpSpPr>
+      <p:sp>
+        <p:nvSpPr>
+          <p:cNvPr id="2" name="Title 1">
+            <a:extLst>
+              <a:ext uri="{FF2B5EF4-FFF2-40B4-BE49-F238E27FC236}">
+                <a16:creationId xmlns:a16="http://schemas.microsoft.com/office/drawing/2014/main" id="{821D1021-4CE4-88DA-6709-BE34B5FBA7FA}"/>
+              </a:ext>
+            </a:extLst>
+          </p:cNvPr>
+          <p:cNvSpPr>
+            <a:spLocks noGrp="1"/>
+          </p:cNvSpPr>
+          <p:nvPr>
+            <p:ph type="title"/>
+          </p:nvPr>
+        </p:nvSpPr>
+        <p:spPr>
+          <a:xfrm>
+            <a:off x="1371597" y="348865"/>
+            <a:ext cx="10044023" cy="877729"/>
+          </a:xfrm>
+        </p:spPr>
+        <p:txBody>
+          <a:bodyPr anchor="ctr">
+            <a:normAutofit/>
+          </a:bodyPr>
+          <a:lstStyle/>
+          <a:p>
+            <a:r>
+              <a:rPr lang="en-US" sz="4000">
+                <a:solidFill>
+                  <a:srgbClr val="FFFFFF"/>
+                </a:solidFill>
+                <a:cs typeface="Calibri Light"/>
+              </a:rPr>
+              <a:t>Significance in Technical Analysis</a:t>
+            </a:r>
+            <a:endParaRPr lang="en-US" sz="4000">
+              <a:solidFill>
+                <a:srgbClr val="FFFFFF"/>
+              </a:solidFill>
+            </a:endParaRPr>
+          </a:p>
+        </p:txBody>
+      </p:sp>
+      <p:graphicFrame>
+        <p:nvGraphicFramePr>
+          <p:cNvPr id="5" name="Content Placeholder 2">
+            <a:extLst>
+              <a:ext uri="{FF2B5EF4-FFF2-40B4-BE49-F238E27FC236}">
+                <a16:creationId xmlns:a16="http://schemas.microsoft.com/office/drawing/2014/main" id="{5AFA4670-8CDA-F205-2385-1C6EAECAC90F}"/>
+              </a:ext>
+            </a:extLst>
+          </p:cNvPr>
+          <p:cNvGraphicFramePr>
+            <a:graphicFrameLocks noGrp="1"/>
+          </p:cNvGraphicFramePr>
+          <p:nvPr>
+            <p:ph idx="1"/>
+            <p:extLst>
+              <p:ext uri="{D42A27DB-BD31-4B8C-83A1-F6EECF244321}">
+                <p14:modId xmlns:p14="http://schemas.microsoft.com/office/powerpoint/2010/main" val="55618716"/>
+              </p:ext>
+            </p:extLst>
+          </p:nvPr>
+        </p:nvGraphicFramePr>
+        <p:xfrm>
+          <a:off x="487791" y="608899"/>
+          <a:ext cx="10927829" cy="4192805"/>
+        </p:xfrm>
+        <a:graphic>
+          <a:graphicData uri="http://schemas.openxmlformats.org/drawingml/2006/diagram">
+            <dgm:relIds xmlns:dgm="http://schemas.openxmlformats.org/drawingml/2006/diagram" xmlns:r="http://schemas.openxmlformats.org/officeDocument/2006/relationships" r:dm="rId3" r:lo="rId4" r:qs="rId5" r:cs="rId6"/>
+          </a:graphicData>
+        </a:graphic>
+      </p:graphicFrame>
+      <p:pic>
+        <p:nvPicPr>
+          <p:cNvPr id="8" name="Picture 7">
+            <a:extLst>
+              <a:ext uri="{FF2B5EF4-FFF2-40B4-BE49-F238E27FC236}">
+                <a16:creationId xmlns:a16="http://schemas.microsoft.com/office/drawing/2014/main" id="{6997DE69-5B7A-4F61-8C1C-248529E9E6D8}"/>
+              </a:ext>
+            </a:extLst>
+          </p:cNvPr>
+          <p:cNvPicPr>
+            <a:picLocks noChangeAspect="1"/>
+          </p:cNvPicPr>
+          <p:nvPr/>
+        </p:nvPicPr>
+        <p:blipFill>
+          <a:blip r:embed="rId8"/>
+          <a:stretch>
+            <a:fillRect/>
+          </a:stretch>
+        </p:blipFill>
+        <p:spPr>
+          <a:xfrm>
+            <a:off x="1" y="5928995"/>
+            <a:ext cx="508000" cy="657013"/>
+          </a:xfrm>
+          <a:prstGeom prst="rect">
+            <a:avLst/>
+          </a:prstGeom>
+        </p:spPr>
+      </p:pic>
+    </p:spTree>
+    <p:extLst>
+      <p:ext uri="{BB962C8B-B14F-4D97-AF65-F5344CB8AC3E}">
+        <p14:creationId xmlns:p14="http://schemas.microsoft.com/office/powerpoint/2010/main" val="685595852"/>
+      </p:ext>
+    </p:extLst>
+  </p:cSld>
+  <p:clrMapOvr>
+    <a:masterClrMapping/>
+  </p:clrMapOvr>
+</p:sld>
+</file>
+
 <file path=ppt/slides/slide2.xml><?xml version="1.0" encoding="utf-8"?>
 <p:sld xmlns:a="http://schemas.openxmlformats.org/drawingml/2006/main" xmlns:r="http://schemas.openxmlformats.org/officeDocument/2006/relationships" xmlns:p="http://schemas.openxmlformats.org/presentationml/2006/main">
   <p:cSld>
@@ -17936,7 +17983,7 @@
             </a:pPr>
             <a:r>
               <a:rPr lang="en-US" sz="2400" b="1" dirty="0"/>
-              <a:t>Stock Price comparison - Rohit </a:t>
+              <a:t>Stock Price Comparison - Rohit </a:t>
             </a:r>
           </a:p>
           <a:p>
@@ -17945,7 +17992,7 @@
             </a:pPr>
             <a:r>
               <a:rPr lang="en-US" sz="2400" b="1" dirty="0"/>
-              <a:t>Pre and post covid trading volume - Ammar</a:t>
+              <a:t>Trading Volumes - Ammar</a:t>
             </a:r>
           </a:p>
           <a:p>
@@ -17954,7 +18001,7 @@
             </a:pPr>
             <a:r>
               <a:rPr lang="en-US" sz="2400" b="1" dirty="0"/>
-              <a:t>When to buy a stock – Sujatha</a:t>
+              <a:t>When to Buy a Stock – Sujatha</a:t>
             </a:r>
           </a:p>
           <a:p>
@@ -18278,142 +18325,6 @@
           <p:cNvPr id="2" name="Title 1">
             <a:extLst>
               <a:ext uri="{FF2B5EF4-FFF2-40B4-BE49-F238E27FC236}">
-                <a16:creationId xmlns:a16="http://schemas.microsoft.com/office/drawing/2014/main" id="{821D1021-4CE4-88DA-6709-BE34B5FBA7FA}"/>
-              </a:ext>
-            </a:extLst>
-          </p:cNvPr>
-          <p:cNvSpPr>
-            <a:spLocks noGrp="1"/>
-          </p:cNvSpPr>
-          <p:nvPr>
-            <p:ph type="title"/>
-          </p:nvPr>
-        </p:nvSpPr>
-        <p:spPr>
-          <a:xfrm>
-            <a:off x="1371597" y="348865"/>
-            <a:ext cx="10044023" cy="877729"/>
-          </a:xfrm>
-        </p:spPr>
-        <p:txBody>
-          <a:bodyPr anchor="ctr">
-            <a:normAutofit/>
-          </a:bodyPr>
-          <a:lstStyle/>
-          <a:p>
-            <a:r>
-              <a:rPr lang="en-US" sz="4000">
-                <a:solidFill>
-                  <a:srgbClr val="FFFFFF"/>
-                </a:solidFill>
-                <a:cs typeface="Calibri Light"/>
-              </a:rPr>
-              <a:t>Significance in Technical Analysis</a:t>
-            </a:r>
-            <a:endParaRPr lang="en-US" sz="4000">
-              <a:solidFill>
-                <a:srgbClr val="FFFFFF"/>
-              </a:solidFill>
-            </a:endParaRPr>
-          </a:p>
-        </p:txBody>
-      </p:sp>
-      <p:graphicFrame>
-        <p:nvGraphicFramePr>
-          <p:cNvPr id="5" name="Content Placeholder 2">
-            <a:extLst>
-              <a:ext uri="{FF2B5EF4-FFF2-40B4-BE49-F238E27FC236}">
-                <a16:creationId xmlns:a16="http://schemas.microsoft.com/office/drawing/2014/main" id="{5AFA4670-8CDA-F205-2385-1C6EAECAC90F}"/>
-              </a:ext>
-            </a:extLst>
-          </p:cNvPr>
-          <p:cNvGraphicFramePr>
-            <a:graphicFrameLocks noGrp="1"/>
-          </p:cNvGraphicFramePr>
-          <p:nvPr>
-            <p:ph idx="1"/>
-            <p:extLst>
-              <p:ext uri="{D42A27DB-BD31-4B8C-83A1-F6EECF244321}">
-                <p14:modId xmlns:p14="http://schemas.microsoft.com/office/powerpoint/2010/main" val="55618716"/>
-              </p:ext>
-            </p:extLst>
-          </p:nvPr>
-        </p:nvGraphicFramePr>
-        <p:xfrm>
-          <a:off x="487791" y="608899"/>
-          <a:ext cx="10927829" cy="4192805"/>
-        </p:xfrm>
-        <a:graphic>
-          <a:graphicData uri="http://schemas.openxmlformats.org/drawingml/2006/diagram">
-            <dgm:relIds xmlns:dgm="http://schemas.openxmlformats.org/drawingml/2006/diagram" xmlns:r="http://schemas.openxmlformats.org/officeDocument/2006/relationships" r:dm="rId3" r:lo="rId4" r:qs="rId5" r:cs="rId6"/>
-          </a:graphicData>
-        </a:graphic>
-      </p:graphicFrame>
-      <p:pic>
-        <p:nvPicPr>
-          <p:cNvPr id="8" name="Picture 7">
-            <a:extLst>
-              <a:ext uri="{FF2B5EF4-FFF2-40B4-BE49-F238E27FC236}">
-                <a16:creationId xmlns:a16="http://schemas.microsoft.com/office/drawing/2014/main" id="{6997DE69-5B7A-4F61-8C1C-248529E9E6D8}"/>
-              </a:ext>
-            </a:extLst>
-          </p:cNvPr>
-          <p:cNvPicPr>
-            <a:picLocks noChangeAspect="1"/>
-          </p:cNvPicPr>
-          <p:nvPr/>
-        </p:nvPicPr>
-        <p:blipFill>
-          <a:blip r:embed="rId8"/>
-          <a:stretch>
-            <a:fillRect/>
-          </a:stretch>
-        </p:blipFill>
-        <p:spPr>
-          <a:xfrm>
-            <a:off x="1" y="5928995"/>
-            <a:ext cx="508000" cy="657013"/>
-          </a:xfrm>
-          <a:prstGeom prst="rect">
-            <a:avLst/>
-          </a:prstGeom>
-        </p:spPr>
-      </p:pic>
-    </p:spTree>
-    <p:extLst>
-      <p:ext uri="{BB962C8B-B14F-4D97-AF65-F5344CB8AC3E}">
-        <p14:creationId xmlns:p14="http://schemas.microsoft.com/office/powerpoint/2010/main" val="685595852"/>
-      </p:ext>
-    </p:extLst>
-  </p:cSld>
-  <p:clrMapOvr>
-    <a:masterClrMapping/>
-  </p:clrMapOvr>
-</p:sld>
-</file>
-
-<file path=ppt/slides/slide21.xml><?xml version="1.0" encoding="utf-8"?>
-<p:sld xmlns:a="http://schemas.openxmlformats.org/drawingml/2006/main" xmlns:r="http://schemas.openxmlformats.org/officeDocument/2006/relationships" xmlns:p="http://schemas.openxmlformats.org/presentationml/2006/main">
-  <p:cSld>
-    <p:spTree>
-      <p:nvGrpSpPr>
-        <p:cNvPr id="1" name=""/>
-        <p:cNvGrpSpPr/>
-        <p:nvPr/>
-      </p:nvGrpSpPr>
-      <p:grpSpPr>
-        <a:xfrm>
-          <a:off x="0" y="0"/>
-          <a:ext cx="0" cy="0"/>
-          <a:chOff x="0" y="0"/>
-          <a:chExt cx="0" cy="0"/>
-        </a:xfrm>
-      </p:grpSpPr>
-      <p:sp>
-        <p:nvSpPr>
-          <p:cNvPr id="2" name="Title 1">
-            <a:extLst>
-              <a:ext uri="{FF2B5EF4-FFF2-40B4-BE49-F238E27FC236}">
                 <a16:creationId xmlns:a16="http://schemas.microsoft.com/office/drawing/2014/main" id="{1836E49C-11A0-4C95-8A6E-FC7E9C57C105}"/>
               </a:ext>
             </a:extLst>
@@ -18715,7 +18626,7 @@
                 <a:tabLst/>
                 <a:defRPr/>
               </a:pPr>
-              <a:t>21</a:t>
+              <a:t>20</a:t>
             </a:fld>
             <a:endParaRPr kumimoji="0" lang="en-US" sz="1200" b="0" i="0" u="none" strike="noStrike" kern="1200" cap="none" spc="0" normalizeH="0" baseline="0" noProof="0" dirty="0">
               <a:ln>
@@ -19379,8 +19290,8 @@
         </p:blipFill>
         <p:spPr bwMode="auto">
           <a:xfrm>
-            <a:off x="48986" y="171975"/>
-            <a:ext cx="5606330" cy="3145697"/>
+            <a:off x="6514175" y="3992082"/>
+            <a:ext cx="4487738" cy="2518058"/>
           </a:xfrm>
           <a:prstGeom prst="rect">
             <a:avLst/>
@@ -19428,8 +19339,8 @@
         </p:blipFill>
         <p:spPr bwMode="auto">
           <a:xfrm>
-            <a:off x="5655316" y="98362"/>
-            <a:ext cx="5868719" cy="3292922"/>
+            <a:off x="87850" y="174237"/>
+            <a:ext cx="6426325" cy="4032001"/>
           </a:xfrm>
           <a:prstGeom prst="rect">
             <a:avLst/>
@@ -19475,8 +19386,8 @@
         </p:blipFill>
         <p:spPr bwMode="auto">
           <a:xfrm>
-            <a:off x="358580" y="3391284"/>
-            <a:ext cx="5606330" cy="3145696"/>
+            <a:off x="6248400" y="347860"/>
+            <a:ext cx="5796404" cy="3737764"/>
           </a:xfrm>
           <a:prstGeom prst="rect">
             <a:avLst/>
@@ -19522,8 +19433,8 @@
         </p:blipFill>
         <p:spPr bwMode="auto">
           <a:xfrm>
-            <a:off x="5608216" y="3262795"/>
-            <a:ext cx="6225204" cy="3492945"/>
+            <a:off x="298195" y="3881186"/>
+            <a:ext cx="4994814" cy="2802577"/>
           </a:xfrm>
           <a:prstGeom prst="rect">
             <a:avLst/>
@@ -20011,7 +19922,7 @@
           <p:cNvPr id="2" name="Title 1">
             <a:extLst>
               <a:ext uri="{FF2B5EF4-FFF2-40B4-BE49-F238E27FC236}">
-                <a16:creationId xmlns:a16="http://schemas.microsoft.com/office/drawing/2014/main" id="{833E644B-2507-D40B-4AFF-217572ECBB30}"/>
+                <a16:creationId xmlns:a16="http://schemas.microsoft.com/office/drawing/2014/main" id="{F3D8413F-CE7A-9AF7-EE59-2E8B811A6043}"/>
               </a:ext>
             </a:extLst>
           </p:cNvPr>
@@ -20019,108 +19930,55 @@
             <a:spLocks noGrp="1"/>
           </p:cNvSpPr>
           <p:nvPr>
-            <p:ph type="title"/>
+            <p:ph type="ctrTitle"/>
           </p:nvPr>
         </p:nvSpPr>
-        <p:spPr/>
+        <p:spPr>
+          <a:xfrm>
+            <a:off x="6471920" y="3881120"/>
+            <a:ext cx="3985064" cy="1527982"/>
+          </a:xfrm>
+        </p:spPr>
         <p:txBody>
-          <a:bodyPr/>
+          <a:bodyPr>
+            <a:noAutofit/>
+          </a:bodyPr>
           <a:lstStyle/>
           <a:p>
-            <a:pPr algn="ctr"/>
-            <a:r>
-              <a:rPr lang="en-AU" dirty="0"/>
-              <a:t>Limitations</a:t>
+            <a:r>
+              <a:rPr lang="en-US" sz="3600" dirty="0"/>
+              <a:t>Volume Changes of Major stocks </a:t>
+            </a:r>
+            <a:br>
+              <a:rPr lang="en-US" sz="3600" dirty="0"/>
+            </a:br>
+            <a:br>
+              <a:rPr lang="en-AU" sz="2800" dirty="0"/>
+            </a:br>
+            <a:br>
+              <a:rPr lang="en-AU" sz="2800" dirty="0"/>
+            </a:br>
+            <a:r>
+              <a:rPr lang="en-US" sz="2800" dirty="0"/>
+              <a:t>Meta (formerly Facebook) v. Microsoft </a:t>
+            </a:r>
+            <a:br>
+              <a:rPr lang="en-US" sz="2800" dirty="0"/>
+            </a:br>
+            <a:br>
+              <a:rPr lang="en-AU" sz="2800" dirty="0"/>
+            </a:br>
+            <a:r>
+              <a:rPr lang="en-AU" sz="2800" dirty="0"/>
+              <a:t>by Ammar</a:t>
             </a:r>
           </a:p>
         </p:txBody>
       </p:sp>
-      <p:sp>
-        <p:nvSpPr>
-          <p:cNvPr id="3" name="Content Placeholder 2">
-            <a:extLst>
-              <a:ext uri="{FF2B5EF4-FFF2-40B4-BE49-F238E27FC236}">
-                <a16:creationId xmlns:a16="http://schemas.microsoft.com/office/drawing/2014/main" id="{19AA2DBE-B269-C7C3-6B47-AD5B7169DF73}"/>
-              </a:ext>
-            </a:extLst>
-          </p:cNvPr>
-          <p:cNvSpPr>
-            <a:spLocks noGrp="1"/>
-          </p:cNvSpPr>
-          <p:nvPr>
-            <p:ph idx="1"/>
-          </p:nvPr>
-        </p:nvSpPr>
-        <p:spPr/>
-        <p:txBody>
-          <a:bodyPr/>
-          <a:lstStyle/>
-          <a:p>
-            <a:r>
-              <a:rPr lang="en-AU" dirty="0"/>
-              <a:t>Many other factors to determine stock performance</a:t>
-            </a:r>
-          </a:p>
-          <a:p>
-            <a:r>
-              <a:rPr lang="en-AU" dirty="0"/>
-              <a:t>Earnings per share</a:t>
-            </a:r>
-          </a:p>
-          <a:p>
-            <a:r>
-              <a:rPr lang="en-AU" dirty="0"/>
-              <a:t>Price to earnings ratio</a:t>
-            </a:r>
-          </a:p>
-          <a:p>
-            <a:r>
-              <a:rPr lang="en-AU" dirty="0"/>
-              <a:t>Net margins (how efficiently a company is creating profit)</a:t>
-            </a:r>
-          </a:p>
-          <a:p>
-            <a:pPr marL="0" indent="0">
-              <a:buNone/>
-            </a:pPr>
-            <a:endParaRPr lang="en-AU" dirty="0"/>
-          </a:p>
-        </p:txBody>
-      </p:sp>
-      <p:pic>
-        <p:nvPicPr>
-          <p:cNvPr id="4" name="Picture 3">
-            <a:extLst>
-              <a:ext uri="{FF2B5EF4-FFF2-40B4-BE49-F238E27FC236}">
-                <a16:creationId xmlns:a16="http://schemas.microsoft.com/office/drawing/2014/main" id="{B3D971A7-96DA-46A7-8291-49E633FF4E5B}"/>
-              </a:ext>
-            </a:extLst>
-          </p:cNvPr>
-          <p:cNvPicPr>
-            <a:picLocks noChangeAspect="1"/>
-          </p:cNvPicPr>
-          <p:nvPr/>
-        </p:nvPicPr>
-        <p:blipFill>
-          <a:blip r:embed="rId2"/>
-          <a:stretch>
-            <a:fillRect/>
-          </a:stretch>
-        </p:blipFill>
-        <p:spPr>
-          <a:xfrm>
-            <a:off x="30480" y="5963920"/>
-            <a:ext cx="494661" cy="639762"/>
-          </a:xfrm>
-          <a:prstGeom prst="rect">
-            <a:avLst/>
-          </a:prstGeom>
-        </p:spPr>
-      </p:pic>
     </p:spTree>
     <p:extLst>
       <p:ext uri="{BB962C8B-B14F-4D97-AF65-F5344CB8AC3E}">
-        <p14:creationId xmlns:p14="http://schemas.microsoft.com/office/powerpoint/2010/main" val="3920142561"/>
+        <p14:creationId xmlns:p14="http://schemas.microsoft.com/office/powerpoint/2010/main" val="2357426616"/>
       </p:ext>
     </p:extLst>
   </p:cSld>

</xml_diff>